<commit_message>
updated lecture notes for lecture 7
</commit_message>
<xml_diff>
--- a/docs/lecture_slides/Week 5/Week5_Lecture7_Slides_2_4_2024.pptx
+++ b/docs/lecture_slides/Week 5/Week5_Lecture7_Slides_2_4_2024.pptx
@@ -22,12 +22,6 @@
     <p:sldId id="352" r:id="rId16"/>
     <p:sldId id="329" r:id="rId17"/>
     <p:sldId id="330" r:id="rId18"/>
-    <p:sldId id="331" r:id="rId19"/>
-    <p:sldId id="332" r:id="rId20"/>
-    <p:sldId id="333" r:id="rId21"/>
-    <p:sldId id="257" r:id="rId22"/>
-    <p:sldId id="346" r:id="rId23"/>
-    <p:sldId id="347" r:id="rId24"/>
   </p:sldIdLst>
   <p:sldSz cx="12192000" cy="6858000"/>
   <p:notesSz cx="6858000" cy="9144000"/>
@@ -6452,586 +6446,6 @@
 </p:sld>
 </file>
 
-<file path=ppt/slides/slide18.xml><?xml version="1.0" encoding="utf-8"?>
-<p:sld xmlns:a="http://schemas.openxmlformats.org/drawingml/2006/main" xmlns:r="http://schemas.openxmlformats.org/officeDocument/2006/relationships" xmlns:p="http://schemas.openxmlformats.org/presentationml/2006/main">
-  <p:cSld>
-    <p:spTree>
-      <p:nvGrpSpPr>
-        <p:cNvPr id="1" name=""/>
-        <p:cNvGrpSpPr/>
-        <p:nvPr/>
-      </p:nvGrpSpPr>
-      <p:grpSpPr>
-        <a:xfrm>
-          <a:off x="0" y="0"/>
-          <a:ext cx="0" cy="0"/>
-          <a:chOff x="0" y="0"/>
-          <a:chExt cx="0" cy="0"/>
-        </a:xfrm>
-      </p:grpSpPr>
-      <p:sp>
-        <p:nvSpPr>
-          <p:cNvPr id="2" name="Title 1">
-            <a:extLst>
-              <a:ext uri="{FF2B5EF4-FFF2-40B4-BE49-F238E27FC236}">
-                <a16:creationId xmlns:a16="http://schemas.microsoft.com/office/drawing/2014/main" id="{D2E9EF3E-AA2F-7D35-68FA-59EF07096D3D}"/>
-              </a:ext>
-            </a:extLst>
-          </p:cNvPr>
-          <p:cNvSpPr>
-            <a:spLocks noGrp="1"/>
-          </p:cNvSpPr>
-          <p:nvPr>
-            <p:ph type="title"/>
-          </p:nvPr>
-        </p:nvSpPr>
-        <p:spPr>
-          <a:xfrm>
-            <a:off x="256309" y="18255"/>
-            <a:ext cx="10515600" cy="1325563"/>
-          </a:xfrm>
-        </p:spPr>
-        <p:txBody>
-          <a:bodyPr>
-            <a:normAutofit/>
-          </a:bodyPr>
-          <a:lstStyle/>
-          <a:p>
-            <a:r>
-              <a:rPr lang="en-US" sz="4000" dirty="0"/>
-              <a:t>A Note About Transformations of Variables…</a:t>
-            </a:r>
-          </a:p>
-        </p:txBody>
-      </p:sp>
-      <mc:AlternateContent xmlns:mc="http://schemas.openxmlformats.org/markup-compatibility/2006" xmlns:a14="http://schemas.microsoft.com/office/drawing/2010/main">
-        <mc:Choice Requires="a14">
-          <p:sp>
-            <p:nvSpPr>
-              <p:cNvPr id="3" name="Content Placeholder 2">
-                <a:extLst>
-                  <a:ext uri="{FF2B5EF4-FFF2-40B4-BE49-F238E27FC236}">
-                    <a16:creationId xmlns:a16="http://schemas.microsoft.com/office/drawing/2014/main" id="{C12FE30C-AFBE-E998-BDEF-D3E7157370A9}"/>
-                  </a:ext>
-                </a:extLst>
-              </p:cNvPr>
-              <p:cNvSpPr>
-                <a:spLocks noGrp="1"/>
-              </p:cNvSpPr>
-              <p:nvPr>
-                <p:ph idx="1"/>
-              </p:nvPr>
-            </p:nvSpPr>
-            <p:spPr>
-              <a:xfrm>
-                <a:off x="256309" y="1343818"/>
-                <a:ext cx="10515600" cy="5223237"/>
-              </a:xfrm>
-            </p:spPr>
-            <p:txBody>
-              <a:bodyPr>
-                <a:normAutofit/>
-              </a:bodyPr>
-              <a:lstStyle/>
-              <a:p>
-                <a:r>
-                  <a:rPr lang="en-US" dirty="0"/>
-                  <a:t>We often need to change the units of measurement of a variable such as from Fahrenheit to Celsius, Feet to meters, dollars to euros etc.</a:t>
-                </a:r>
-              </a:p>
-              <a:p>
-                <a:endParaRPr lang="en-US" dirty="0"/>
-              </a:p>
-              <a:p>
-                <a:r>
-                  <a:rPr lang="en-US" dirty="0"/>
-                  <a:t>Linear transformations: adding, subtracting, multiplying, dividing</a:t>
-                </a:r>
-              </a:p>
-              <a:p>
-                <a:pPr lvl="2">
-                  <a:buFontTx/>
-                  <a:buChar char="-"/>
-                </a:pPr>
-                <a:r>
-                  <a:rPr lang="en-US" dirty="0"/>
-                  <a:t>Linear transformations take the form </a:t>
-                </a:r>
-                <a14:m>
-                  <m:oMath xmlns:m="http://schemas.openxmlformats.org/officeDocument/2006/math">
-                    <m:r>
-                      <a:rPr lang="en-US" b="0" i="1" smtClean="0">
-                        <a:latin typeface="Cambria Math" panose="02040503050406030204" pitchFamily="18" charset="0"/>
-                      </a:rPr>
-                      <m:t>𝑦</m:t>
-                    </m:r>
-                    <m:r>
-                      <a:rPr lang="en-US" b="0" i="1" smtClean="0">
-                        <a:latin typeface="Cambria Math" panose="02040503050406030204" pitchFamily="18" charset="0"/>
-                      </a:rPr>
-                      <m:t>=</m:t>
-                    </m:r>
-                    <m:r>
-                      <a:rPr lang="en-US" b="0" i="1" smtClean="0">
-                        <a:latin typeface="Cambria Math" panose="02040503050406030204" pitchFamily="18" charset="0"/>
-                      </a:rPr>
-                      <m:t>𝑎𝑥</m:t>
-                    </m:r>
-                    <m:r>
-                      <a:rPr lang="en-US" b="0" i="1" smtClean="0">
-                        <a:latin typeface="Cambria Math" panose="02040503050406030204" pitchFamily="18" charset="0"/>
-                      </a:rPr>
-                      <m:t>+</m:t>
-                    </m:r>
-                    <m:r>
-                      <a:rPr lang="en-US" b="0" i="1" smtClean="0">
-                        <a:latin typeface="Cambria Math" panose="02040503050406030204" pitchFamily="18" charset="0"/>
-                      </a:rPr>
-                      <m:t>𝑏</m:t>
-                    </m:r>
-                  </m:oMath>
-                </a14:m>
-                <a:r>
-                  <a:rPr lang="en-US" dirty="0"/>
-                  <a:t> (scaling + shift)</a:t>
-                </a:r>
-              </a:p>
-              <a:p>
-                <a:pPr lvl="2">
-                  <a:buFontTx/>
-                  <a:buChar char="-"/>
-                </a:pPr>
-                <a14:m>
-                  <m:oMath xmlns:m="http://schemas.openxmlformats.org/officeDocument/2006/math">
-                    <m:r>
-                      <a:rPr lang="en-US" b="0" i="1" smtClean="0">
-                        <a:latin typeface="Cambria Math" panose="02040503050406030204" pitchFamily="18" charset="0"/>
-                      </a:rPr>
-                      <m:t>𝑎</m:t>
-                    </m:r>
-                  </m:oMath>
-                </a14:m>
-                <a:r>
-                  <a:rPr lang="en-US" dirty="0"/>
-                  <a:t> is a </a:t>
-                </a:r>
-                <a:r>
-                  <a:rPr lang="en-US" b="1" dirty="0"/>
-                  <a:t>scaling</a:t>
-                </a:r>
-                <a:r>
-                  <a:rPr lang="en-US" dirty="0"/>
-                  <a:t> constant, </a:t>
-                </a:r>
-                <a14:m>
-                  <m:oMath xmlns:m="http://schemas.openxmlformats.org/officeDocument/2006/math">
-                    <m:r>
-                      <a:rPr lang="en-US" b="0" i="1" smtClean="0">
-                        <a:latin typeface="Cambria Math" panose="02040503050406030204" pitchFamily="18" charset="0"/>
-                      </a:rPr>
-                      <m:t>𝑏</m:t>
-                    </m:r>
-                  </m:oMath>
-                </a14:m>
-                <a:r>
-                  <a:rPr lang="en-US" dirty="0"/>
-                  <a:t> is a </a:t>
-                </a:r>
-                <a:r>
-                  <a:rPr lang="en-US" b="1" dirty="0"/>
-                  <a:t>shifting</a:t>
-                </a:r>
-                <a:r>
-                  <a:rPr lang="en-US" dirty="0"/>
-                  <a:t> constant, </a:t>
-                </a:r>
-                <a14:m>
-                  <m:oMath xmlns:m="http://schemas.openxmlformats.org/officeDocument/2006/math">
-                    <m:r>
-                      <a:rPr lang="en-US" b="0" i="1" smtClean="0">
-                        <a:latin typeface="Cambria Math" panose="02040503050406030204" pitchFamily="18" charset="0"/>
-                      </a:rPr>
-                      <m:t>𝑥</m:t>
-                    </m:r>
-                  </m:oMath>
-                </a14:m>
-                <a:r>
-                  <a:rPr lang="en-US" dirty="0"/>
-                  <a:t> is the original variable and </a:t>
-                </a:r>
-                <a14:m>
-                  <m:oMath xmlns:m="http://schemas.openxmlformats.org/officeDocument/2006/math">
-                    <m:r>
-                      <a:rPr lang="en-US" b="0" i="1" smtClean="0">
-                        <a:latin typeface="Cambria Math" panose="02040503050406030204" pitchFamily="18" charset="0"/>
-                      </a:rPr>
-                      <m:t>𝑦</m:t>
-                    </m:r>
-                  </m:oMath>
-                </a14:m>
-                <a:r>
-                  <a:rPr lang="en-US" dirty="0"/>
-                  <a:t> the transformed variable</a:t>
-                </a:r>
-              </a:p>
-              <a:p>
-                <a:pPr lvl="2">
-                  <a:buFontTx/>
-                  <a:buChar char="-"/>
-                </a:pPr>
-                <a:r>
-                  <a:rPr lang="en-US" dirty="0"/>
-                  <a:t>The </a:t>
-                </a:r>
-                <a14:m>
-                  <m:oMath xmlns:m="http://schemas.openxmlformats.org/officeDocument/2006/math">
-                    <m:r>
-                      <a:rPr lang="en-US" b="0" i="1" smtClean="0">
-                        <a:latin typeface="Cambria Math" panose="02040503050406030204" pitchFamily="18" charset="0"/>
-                      </a:rPr>
-                      <m:t>𝑧</m:t>
-                    </m:r>
-                    <m:r>
-                      <a:rPr lang="en-US" b="0" i="1" smtClean="0">
-                        <a:latin typeface="Cambria Math" panose="02040503050406030204" pitchFamily="18" charset="0"/>
-                      </a:rPr>
-                      <m:t>−</m:t>
-                    </m:r>
-                  </m:oMath>
-                </a14:m>
-                <a:r>
-                  <a:rPr lang="en-US" dirty="0"/>
-                  <a:t>score is a linear transformation</a:t>
-                </a:r>
-              </a:p>
-              <a:p>
-                <a:pPr lvl="2">
-                  <a:buFontTx/>
-                  <a:buChar char="-"/>
-                </a:pPr>
-                <a:r>
-                  <a:rPr lang="en-US" dirty="0"/>
-                  <a:t>Linear transformations preserve the shape of variables distribution</a:t>
-                </a:r>
-              </a:p>
-              <a:p>
-                <a:pPr marL="914400" lvl="2" indent="0">
-                  <a:buNone/>
-                </a:pPr>
-                <a:endParaRPr lang="en-US" dirty="0"/>
-              </a:p>
-              <a:p>
-                <a:r>
-                  <a:rPr lang="en-US" dirty="0"/>
-                  <a:t>Nonlinear transformations: squaring, taking roots, logarithm, exponentiation, </a:t>
-                </a:r>
-                <a:r>
-                  <a:rPr lang="en-US" dirty="0" err="1"/>
-                  <a:t>etc</a:t>
-                </a:r>
-                <a:endParaRPr lang="en-US" dirty="0"/>
-              </a:p>
-              <a:p>
-                <a:pPr marL="914400" lvl="2" indent="0">
-                  <a:buNone/>
-                </a:pPr>
-                <a:r>
-                  <a:rPr lang="en-US" dirty="0"/>
-                  <a:t>- </a:t>
-                </a:r>
-                <a:r>
-                  <a:rPr lang="en-US" b="1" u="sng" dirty="0"/>
-                  <a:t>Do not</a:t>
-                </a:r>
-                <a:r>
-                  <a:rPr lang="en-US" dirty="0"/>
-                  <a:t> preserve the shape of a variable’s distribution</a:t>
-                </a:r>
-              </a:p>
-              <a:p>
-                <a:pPr marL="914400" lvl="2" indent="0">
-                  <a:buNone/>
-                </a:pPr>
-                <a:endParaRPr lang="en-US" dirty="0"/>
-              </a:p>
-            </p:txBody>
-          </p:sp>
-        </mc:Choice>
-        <mc:Fallback xmlns="">
-          <p:sp>
-            <p:nvSpPr>
-              <p:cNvPr id="3" name="Content Placeholder 2">
-                <a:extLst>
-                  <a:ext uri="{FF2B5EF4-FFF2-40B4-BE49-F238E27FC236}">
-                    <a16:creationId xmlns:a16="http://schemas.microsoft.com/office/drawing/2014/main" id="{C12FE30C-AFBE-E998-BDEF-D3E7157370A9}"/>
-                  </a:ext>
-                </a:extLst>
-              </p:cNvPr>
-              <p:cNvSpPr>
-                <a:spLocks noGrp="1" noRot="1" noChangeAspect="1" noMove="1" noResize="1" noEditPoints="1" noAdjustHandles="1" noChangeArrowheads="1" noChangeShapeType="1" noTextEdit="1"/>
-              </p:cNvSpPr>
-              <p:nvPr>
-                <p:ph idx="1"/>
-              </p:nvPr>
-            </p:nvSpPr>
-            <p:spPr>
-              <a:xfrm>
-                <a:off x="256309" y="1343818"/>
-                <a:ext cx="10515600" cy="5223237"/>
-              </a:xfrm>
-              <a:blipFill>
-                <a:blip r:embed="rId2"/>
-                <a:stretch>
-                  <a:fillRect l="-1043" t="-1867" r="-1739"/>
-                </a:stretch>
-              </a:blipFill>
-            </p:spPr>
-            <p:txBody>
-              <a:bodyPr/>
-              <a:lstStyle/>
-              <a:p>
-                <a:r>
-                  <a:rPr lang="en-US">
-                    <a:noFill/>
-                  </a:rPr>
-                  <a:t> </a:t>
-                </a:r>
-              </a:p>
-            </p:txBody>
-          </p:sp>
-        </mc:Fallback>
-      </mc:AlternateContent>
-    </p:spTree>
-    <p:extLst>
-      <p:ext uri="{BB962C8B-B14F-4D97-AF65-F5344CB8AC3E}">
-        <p14:creationId xmlns:p14="http://schemas.microsoft.com/office/powerpoint/2010/main" val="4257032028"/>
-      </p:ext>
-    </p:extLst>
-  </p:cSld>
-  <p:clrMapOvr>
-    <a:masterClrMapping/>
-  </p:clrMapOvr>
-</p:sld>
-</file>
-
-<file path=ppt/slides/slide19.xml><?xml version="1.0" encoding="utf-8"?>
-<p:sld xmlns:a="http://schemas.openxmlformats.org/drawingml/2006/main" xmlns:r="http://schemas.openxmlformats.org/officeDocument/2006/relationships" xmlns:p="http://schemas.openxmlformats.org/presentationml/2006/main">
-  <p:cSld>
-    <p:spTree>
-      <p:nvGrpSpPr>
-        <p:cNvPr id="1" name=""/>
-        <p:cNvGrpSpPr/>
-        <p:nvPr/>
-      </p:nvGrpSpPr>
-      <p:grpSpPr>
-        <a:xfrm>
-          <a:off x="0" y="0"/>
-          <a:ext cx="0" cy="0"/>
-          <a:chOff x="0" y="0"/>
-          <a:chExt cx="0" cy="0"/>
-        </a:xfrm>
-      </p:grpSpPr>
-      <p:sp>
-        <p:nvSpPr>
-          <p:cNvPr id="2" name="Title 1">
-            <a:extLst>
-              <a:ext uri="{FF2B5EF4-FFF2-40B4-BE49-F238E27FC236}">
-                <a16:creationId xmlns:a16="http://schemas.microsoft.com/office/drawing/2014/main" id="{46E70BB4-08C0-9031-E6A2-572CCCABB235}"/>
-              </a:ext>
-            </a:extLst>
-          </p:cNvPr>
-          <p:cNvSpPr>
-            <a:spLocks noGrp="1"/>
-          </p:cNvSpPr>
-          <p:nvPr>
-            <p:ph type="title"/>
-          </p:nvPr>
-        </p:nvSpPr>
-        <p:spPr/>
-        <p:txBody>
-          <a:bodyPr/>
-          <a:lstStyle/>
-          <a:p>
-            <a:r>
-              <a:rPr lang="en-US" dirty="0"/>
-              <a:t>College Student Heights</a:t>
-            </a:r>
-          </a:p>
-        </p:txBody>
-      </p:sp>
-      <p:sp>
-        <p:nvSpPr>
-          <p:cNvPr id="3" name="TextBox 2">
-            <a:extLst>
-              <a:ext uri="{FF2B5EF4-FFF2-40B4-BE49-F238E27FC236}">
-                <a16:creationId xmlns:a16="http://schemas.microsoft.com/office/drawing/2014/main" id="{C810A54F-C512-FAE5-D73C-23A971CC64E2}"/>
-              </a:ext>
-            </a:extLst>
-          </p:cNvPr>
-          <p:cNvSpPr txBox="1"/>
-          <p:nvPr/>
-        </p:nvSpPr>
-        <p:spPr>
-          <a:xfrm>
-            <a:off x="2050473" y="2290618"/>
-            <a:ext cx="1459054" cy="369332"/>
-          </a:xfrm>
-          <a:prstGeom prst="rect">
-            <a:avLst/>
-          </a:prstGeom>
-          <a:noFill/>
-        </p:spPr>
-        <p:txBody>
-          <a:bodyPr wrap="none" rtlCol="0">
-            <a:spAutoFit/>
-          </a:bodyPr>
-          <a:lstStyle/>
-          <a:p>
-            <a:r>
-              <a:rPr lang="en-US" dirty="0"/>
-              <a:t>Original Units</a:t>
-            </a:r>
-          </a:p>
-        </p:txBody>
-      </p:sp>
-      <p:sp>
-        <p:nvSpPr>
-          <p:cNvPr id="4" name="TextBox 3">
-            <a:extLst>
-              <a:ext uri="{FF2B5EF4-FFF2-40B4-BE49-F238E27FC236}">
-                <a16:creationId xmlns:a16="http://schemas.microsoft.com/office/drawing/2014/main" id="{DD0AE7CE-D3D5-0971-9A2D-D8B78661A42C}"/>
-              </a:ext>
-            </a:extLst>
-          </p:cNvPr>
-          <p:cNvSpPr txBox="1"/>
-          <p:nvPr/>
-        </p:nvSpPr>
-        <p:spPr>
-          <a:xfrm>
-            <a:off x="8309230" y="2269092"/>
-            <a:ext cx="862608" cy="369332"/>
-          </a:xfrm>
-          <a:prstGeom prst="rect">
-            <a:avLst/>
-          </a:prstGeom>
-          <a:noFill/>
-        </p:spPr>
-        <p:txBody>
-          <a:bodyPr wrap="none" rtlCol="0">
-            <a:spAutoFit/>
-          </a:bodyPr>
-          <a:lstStyle/>
-          <a:p>
-            <a:r>
-              <a:rPr lang="en-US" dirty="0"/>
-              <a:t>Z-score</a:t>
-            </a:r>
-          </a:p>
-        </p:txBody>
-      </p:sp>
-      <p:pic>
-        <p:nvPicPr>
-          <p:cNvPr id="12" name="Picture 11">
-            <a:extLst>
-              <a:ext uri="{FF2B5EF4-FFF2-40B4-BE49-F238E27FC236}">
-                <a16:creationId xmlns:a16="http://schemas.microsoft.com/office/drawing/2014/main" id="{18D382DC-E215-5965-E0AB-C5E585D7E910}"/>
-              </a:ext>
-            </a:extLst>
-          </p:cNvPr>
-          <p:cNvPicPr>
-            <a:picLocks noChangeAspect="1"/>
-          </p:cNvPicPr>
-          <p:nvPr/>
-        </p:nvPicPr>
-        <p:blipFill>
-          <a:blip r:embed="rId2"/>
-          <a:stretch>
-            <a:fillRect/>
-          </a:stretch>
-        </p:blipFill>
-        <p:spPr>
-          <a:xfrm>
-            <a:off x="0" y="2581794"/>
-            <a:ext cx="5679309" cy="3911081"/>
-          </a:xfrm>
-          <a:prstGeom prst="rect">
-            <a:avLst/>
-          </a:prstGeom>
-        </p:spPr>
-      </p:pic>
-      <p:pic>
-        <p:nvPicPr>
-          <p:cNvPr id="13" name="Picture 12">
-            <a:extLst>
-              <a:ext uri="{FF2B5EF4-FFF2-40B4-BE49-F238E27FC236}">
-                <a16:creationId xmlns:a16="http://schemas.microsoft.com/office/drawing/2014/main" id="{4CB4D567-179F-F6C1-0224-F186B049F88A}"/>
-              </a:ext>
-            </a:extLst>
-          </p:cNvPr>
-          <p:cNvPicPr>
-            <a:picLocks noChangeAspect="1"/>
-          </p:cNvPicPr>
-          <p:nvPr/>
-        </p:nvPicPr>
-        <p:blipFill>
-          <a:blip r:embed="rId3"/>
-          <a:stretch>
-            <a:fillRect/>
-          </a:stretch>
-        </p:blipFill>
-        <p:spPr>
-          <a:xfrm>
-            <a:off x="6585527" y="2581793"/>
-            <a:ext cx="5576493" cy="3911081"/>
-          </a:xfrm>
-          <a:prstGeom prst="rect">
-            <a:avLst/>
-          </a:prstGeom>
-        </p:spPr>
-      </p:pic>
-      <p:pic>
-        <p:nvPicPr>
-          <p:cNvPr id="5" name="Picture 4">
-            <a:extLst>
-              <a:ext uri="{FF2B5EF4-FFF2-40B4-BE49-F238E27FC236}">
-                <a16:creationId xmlns:a16="http://schemas.microsoft.com/office/drawing/2014/main" id="{C9D7CB18-D2AE-27B8-A7C7-47620ED0FC56}"/>
-              </a:ext>
-            </a:extLst>
-          </p:cNvPr>
-          <p:cNvPicPr>
-            <a:picLocks noChangeAspect="1"/>
-          </p:cNvPicPr>
-          <p:nvPr/>
-        </p:nvPicPr>
-        <p:blipFill>
-          <a:blip r:embed="rId4"/>
-          <a:stretch>
-            <a:fillRect/>
-          </a:stretch>
-        </p:blipFill>
-        <p:spPr>
-          <a:xfrm>
-            <a:off x="5503391" y="2152581"/>
-            <a:ext cx="1019317" cy="971686"/>
-          </a:xfrm>
-          <a:prstGeom prst="rect">
-            <a:avLst/>
-          </a:prstGeom>
-        </p:spPr>
-      </p:pic>
-    </p:spTree>
-    <p:extLst>
-      <p:ext uri="{BB962C8B-B14F-4D97-AF65-F5344CB8AC3E}">
-        <p14:creationId xmlns:p14="http://schemas.microsoft.com/office/powerpoint/2010/main" val="2679398308"/>
-      </p:ext>
-    </p:extLst>
-  </p:cSld>
-  <p:clrMapOvr>
-    <a:masterClrMapping/>
-  </p:clrMapOvr>
-</p:sld>
-</file>
-
 <file path=ppt/slides/slide2.xml><?xml version="1.0" encoding="utf-8"?>
 <p:sld xmlns:a="http://schemas.openxmlformats.org/drawingml/2006/main" xmlns:r="http://schemas.openxmlformats.org/officeDocument/2006/relationships" xmlns:p="http://schemas.openxmlformats.org/presentationml/2006/main">
   <p:cSld>
@@ -7118,1414 +6532,6 @@
     <p:extLst>
       <p:ext uri="{BB962C8B-B14F-4D97-AF65-F5344CB8AC3E}">
         <p14:creationId xmlns:p14="http://schemas.microsoft.com/office/powerpoint/2010/main" val="1975067526"/>
-      </p:ext>
-    </p:extLst>
-  </p:cSld>
-  <p:clrMapOvr>
-    <a:masterClrMapping/>
-  </p:clrMapOvr>
-</p:sld>
-</file>
-
-<file path=ppt/slides/slide20.xml><?xml version="1.0" encoding="utf-8"?>
-<p:sld xmlns:a="http://schemas.openxmlformats.org/drawingml/2006/main" xmlns:r="http://schemas.openxmlformats.org/officeDocument/2006/relationships" xmlns:p="http://schemas.openxmlformats.org/presentationml/2006/main">
-  <p:cSld>
-    <p:spTree>
-      <p:nvGrpSpPr>
-        <p:cNvPr id="1" name=""/>
-        <p:cNvGrpSpPr/>
-        <p:nvPr/>
-      </p:nvGrpSpPr>
-      <p:grpSpPr>
-        <a:xfrm>
-          <a:off x="0" y="0"/>
-          <a:ext cx="0" cy="0"/>
-          <a:chOff x="0" y="0"/>
-          <a:chExt cx="0" cy="0"/>
-        </a:xfrm>
-      </p:grpSpPr>
-      <p:sp>
-        <p:nvSpPr>
-          <p:cNvPr id="2" name="Title 1">
-            <a:extLst>
-              <a:ext uri="{FF2B5EF4-FFF2-40B4-BE49-F238E27FC236}">
-                <a16:creationId xmlns:a16="http://schemas.microsoft.com/office/drawing/2014/main" id="{3840D820-1522-2602-84D3-FFCDA58D2C60}"/>
-              </a:ext>
-            </a:extLst>
-          </p:cNvPr>
-          <p:cNvSpPr>
-            <a:spLocks noGrp="1"/>
-          </p:cNvSpPr>
-          <p:nvPr>
-            <p:ph type="title"/>
-          </p:nvPr>
-        </p:nvSpPr>
-        <p:spPr/>
-        <p:txBody>
-          <a:bodyPr/>
-          <a:lstStyle/>
-          <a:p>
-            <a:r>
-              <a:rPr lang="en-US" dirty="0"/>
-              <a:t>More properties of Linear Transformations</a:t>
-            </a:r>
-          </a:p>
-        </p:txBody>
-      </p:sp>
-      <mc:AlternateContent xmlns:mc="http://schemas.openxmlformats.org/markup-compatibility/2006" xmlns:a14="http://schemas.microsoft.com/office/drawing/2010/main">
-        <mc:Choice Requires="a14">
-          <p:sp>
-            <p:nvSpPr>
-              <p:cNvPr id="3" name="Content Placeholder 2">
-                <a:extLst>
-                  <a:ext uri="{FF2B5EF4-FFF2-40B4-BE49-F238E27FC236}">
-                    <a16:creationId xmlns:a16="http://schemas.microsoft.com/office/drawing/2014/main" id="{1CCE655D-177B-3706-8F5E-2003CAE9824E}"/>
-                  </a:ext>
-                </a:extLst>
-              </p:cNvPr>
-              <p:cNvSpPr>
-                <a:spLocks noGrp="1"/>
-              </p:cNvSpPr>
-              <p:nvPr>
-                <p:ph idx="1"/>
-              </p:nvPr>
-            </p:nvSpPr>
-            <p:spPr/>
-            <p:txBody>
-              <a:bodyPr>
-                <a:normAutofit fontScale="92500" lnSpcReduction="10000"/>
-              </a:bodyPr>
-              <a:lstStyle/>
-              <a:p>
-                <a:r>
-                  <a:rPr lang="en-US" dirty="0"/>
-                  <a:t>For a linear transformation of </a:t>
-                </a:r>
-                <a14:m>
-                  <m:oMath xmlns:m="http://schemas.openxmlformats.org/officeDocument/2006/math">
-                    <m:r>
-                      <a:rPr lang="en-US" b="0" i="1" smtClean="0">
-                        <a:latin typeface="Cambria Math" panose="02040503050406030204" pitchFamily="18" charset="0"/>
-                      </a:rPr>
-                      <m:t>𝑥</m:t>
-                    </m:r>
-                  </m:oMath>
-                </a14:m>
-                <a:r>
-                  <a:rPr lang="en-US" dirty="0"/>
-                  <a:t> to </a:t>
-                </a:r>
-                <a14:m>
-                  <m:oMath xmlns:m="http://schemas.openxmlformats.org/officeDocument/2006/math">
-                    <m:r>
-                      <a:rPr lang="en-US" b="0" i="1" smtClean="0">
-                        <a:latin typeface="Cambria Math" panose="02040503050406030204" pitchFamily="18" charset="0"/>
-                      </a:rPr>
-                      <m:t>𝑦</m:t>
-                    </m:r>
-                  </m:oMath>
-                </a14:m>
-                <a:r>
-                  <a:rPr lang="en-US" dirty="0"/>
-                  <a:t>: </a:t>
-                </a:r>
-                <a14:m>
-                  <m:oMath xmlns:m="http://schemas.openxmlformats.org/officeDocument/2006/math">
-                    <m:r>
-                      <a:rPr lang="en-US" b="0" i="1" smtClean="0">
-                        <a:latin typeface="Cambria Math" panose="02040503050406030204" pitchFamily="18" charset="0"/>
-                      </a:rPr>
-                      <m:t>𝑦</m:t>
-                    </m:r>
-                    <m:r>
-                      <a:rPr lang="en-US" b="0" i="1" smtClean="0">
-                        <a:latin typeface="Cambria Math" panose="02040503050406030204" pitchFamily="18" charset="0"/>
-                      </a:rPr>
-                      <m:t>=</m:t>
-                    </m:r>
-                    <m:r>
-                      <a:rPr lang="en-US" b="0" i="1" smtClean="0">
-                        <a:latin typeface="Cambria Math" panose="02040503050406030204" pitchFamily="18" charset="0"/>
-                      </a:rPr>
-                      <m:t>𝑎𝑥</m:t>
-                    </m:r>
-                    <m:r>
-                      <a:rPr lang="en-US" b="0" i="1" smtClean="0">
-                        <a:latin typeface="Cambria Math" panose="02040503050406030204" pitchFamily="18" charset="0"/>
-                      </a:rPr>
-                      <m:t>+</m:t>
-                    </m:r>
-                    <m:r>
-                      <a:rPr lang="en-US" b="0" i="1" smtClean="0">
-                        <a:latin typeface="Cambria Math" panose="02040503050406030204" pitchFamily="18" charset="0"/>
-                      </a:rPr>
-                      <m:t>𝑏</m:t>
-                    </m:r>
-                  </m:oMath>
-                </a14:m>
-                <a:endParaRPr lang="en-US" dirty="0"/>
-              </a:p>
-              <a:p>
-                <a:endParaRPr lang="en-US" dirty="0"/>
-              </a:p>
-              <a:p>
-                <a14:m>
-                  <m:oMath xmlns:m="http://schemas.openxmlformats.org/officeDocument/2006/math">
-                    <m:acc>
-                      <m:accPr>
-                        <m:chr m:val="̅"/>
-                        <m:ctrlPr>
-                          <a:rPr lang="en-US" i="1" smtClean="0">
-                            <a:latin typeface="Cambria Math" panose="02040503050406030204" pitchFamily="18" charset="0"/>
-                          </a:rPr>
-                        </m:ctrlPr>
-                      </m:accPr>
-                      <m:e>
-                        <m:r>
-                          <a:rPr lang="en-US" b="0" i="1" smtClean="0">
-                            <a:latin typeface="Cambria Math" panose="02040503050406030204" pitchFamily="18" charset="0"/>
-                          </a:rPr>
-                          <m:t>𝑦</m:t>
-                        </m:r>
-                      </m:e>
-                    </m:acc>
-                    <m:r>
-                      <a:rPr lang="en-US" b="0" i="1" smtClean="0">
-                        <a:latin typeface="Cambria Math" panose="02040503050406030204" pitchFamily="18" charset="0"/>
-                      </a:rPr>
-                      <m:t>=</m:t>
-                    </m:r>
-                    <m:r>
-                      <a:rPr lang="en-US" b="0" i="1" smtClean="0">
-                        <a:latin typeface="Cambria Math" panose="02040503050406030204" pitchFamily="18" charset="0"/>
-                      </a:rPr>
-                      <m:t>𝑎</m:t>
-                    </m:r>
-                    <m:acc>
-                      <m:accPr>
-                        <m:chr m:val="̅"/>
-                        <m:ctrlPr>
-                          <a:rPr lang="en-US" b="0" i="1" smtClean="0">
-                            <a:latin typeface="Cambria Math" panose="02040503050406030204" pitchFamily="18" charset="0"/>
-                          </a:rPr>
-                        </m:ctrlPr>
-                      </m:accPr>
-                      <m:e>
-                        <m:r>
-                          <a:rPr lang="en-US" b="0" i="1" smtClean="0">
-                            <a:latin typeface="Cambria Math" panose="02040503050406030204" pitchFamily="18" charset="0"/>
-                          </a:rPr>
-                          <m:t>𝑥</m:t>
-                        </m:r>
-                      </m:e>
-                    </m:acc>
-                    <m:r>
-                      <a:rPr lang="en-US" b="0" i="1" smtClean="0">
-                        <a:latin typeface="Cambria Math" panose="02040503050406030204" pitchFamily="18" charset="0"/>
-                      </a:rPr>
-                      <m:t>+</m:t>
-                    </m:r>
-                    <m:r>
-                      <a:rPr lang="en-US" b="0" i="1" smtClean="0">
-                        <a:latin typeface="Cambria Math" panose="02040503050406030204" pitchFamily="18" charset="0"/>
-                      </a:rPr>
-                      <m:t>𝑏</m:t>
-                    </m:r>
-                  </m:oMath>
-                </a14:m>
-                <a:endParaRPr lang="en-US" b="0" dirty="0"/>
-              </a:p>
-              <a:p>
-                <a:endParaRPr lang="en-US" b="0" dirty="0"/>
-              </a:p>
-              <a:p>
-                <a14:m>
-                  <m:oMath xmlns:m="http://schemas.openxmlformats.org/officeDocument/2006/math">
-                    <m:r>
-                      <a:rPr lang="en-US" b="0" i="1" smtClean="0">
-                        <a:latin typeface="Cambria Math" panose="02040503050406030204" pitchFamily="18" charset="0"/>
-                      </a:rPr>
-                      <m:t>𝑚𝑒𝑑𝑖𝑎𝑛</m:t>
-                    </m:r>
-                    <m:d>
-                      <m:dPr>
-                        <m:ctrlPr>
-                          <a:rPr lang="en-US" b="0" i="1" smtClean="0">
-                            <a:latin typeface="Cambria Math" panose="02040503050406030204" pitchFamily="18" charset="0"/>
-                          </a:rPr>
-                        </m:ctrlPr>
-                      </m:dPr>
-                      <m:e>
-                        <m:r>
-                          <a:rPr lang="en-US" b="0" i="1" smtClean="0">
-                            <a:latin typeface="Cambria Math" panose="02040503050406030204" pitchFamily="18" charset="0"/>
-                          </a:rPr>
-                          <m:t>𝑦</m:t>
-                        </m:r>
-                      </m:e>
-                    </m:d>
-                    <m:r>
-                      <a:rPr lang="en-US" b="0" i="1" smtClean="0">
-                        <a:latin typeface="Cambria Math" panose="02040503050406030204" pitchFamily="18" charset="0"/>
-                      </a:rPr>
-                      <m:t>=</m:t>
-                    </m:r>
-                    <m:r>
-                      <a:rPr lang="en-US" b="0" i="1" smtClean="0">
-                        <a:latin typeface="Cambria Math" panose="02040503050406030204" pitchFamily="18" charset="0"/>
-                      </a:rPr>
-                      <m:t>𝑎</m:t>
-                    </m:r>
-                    <m:r>
-                      <a:rPr lang="en-US" b="0" i="1" smtClean="0">
-                        <a:latin typeface="Cambria Math" panose="02040503050406030204" pitchFamily="18" charset="0"/>
-                      </a:rPr>
-                      <m:t>⋅</m:t>
-                    </m:r>
-                    <m:r>
-                      <a:rPr lang="en-US" b="0" i="1" smtClean="0">
-                        <a:latin typeface="Cambria Math" panose="02040503050406030204" pitchFamily="18" charset="0"/>
-                      </a:rPr>
-                      <m:t>𝑚𝑒𝑑𝑖𝑎𝑛</m:t>
-                    </m:r>
-                    <m:d>
-                      <m:dPr>
-                        <m:ctrlPr>
-                          <a:rPr lang="en-US" b="0" i="1" smtClean="0">
-                            <a:latin typeface="Cambria Math" panose="02040503050406030204" pitchFamily="18" charset="0"/>
-                          </a:rPr>
-                        </m:ctrlPr>
-                      </m:dPr>
-                      <m:e>
-                        <m:r>
-                          <a:rPr lang="en-US" b="0" i="1" smtClean="0">
-                            <a:latin typeface="Cambria Math" panose="02040503050406030204" pitchFamily="18" charset="0"/>
-                          </a:rPr>
-                          <m:t>𝑥</m:t>
-                        </m:r>
-                      </m:e>
-                    </m:d>
-                    <m:r>
-                      <a:rPr lang="en-US" b="0" i="1" smtClean="0">
-                        <a:latin typeface="Cambria Math" panose="02040503050406030204" pitchFamily="18" charset="0"/>
-                      </a:rPr>
-                      <m:t>+</m:t>
-                    </m:r>
-                    <m:r>
-                      <a:rPr lang="en-US" b="0" i="1" smtClean="0">
-                        <a:latin typeface="Cambria Math" panose="02040503050406030204" pitchFamily="18" charset="0"/>
-                      </a:rPr>
-                      <m:t>𝑏</m:t>
-                    </m:r>
-                  </m:oMath>
-                </a14:m>
-                <a:endParaRPr lang="en-US" b="0" dirty="0"/>
-              </a:p>
-              <a:p>
-                <a:endParaRPr lang="en-US" b="0" dirty="0"/>
-              </a:p>
-              <a:p>
-                <a14:m>
-                  <m:oMath xmlns:m="http://schemas.openxmlformats.org/officeDocument/2006/math">
-                    <m:sSub>
-                      <m:sSubPr>
-                        <m:ctrlPr>
-                          <a:rPr lang="en-US" b="0" i="1" smtClean="0">
-                            <a:latin typeface="Cambria Math" panose="02040503050406030204" pitchFamily="18" charset="0"/>
-                          </a:rPr>
-                        </m:ctrlPr>
-                      </m:sSubPr>
-                      <m:e>
-                        <m:r>
-                          <a:rPr lang="en-US" b="0" i="1" smtClean="0">
-                            <a:latin typeface="Cambria Math" panose="02040503050406030204" pitchFamily="18" charset="0"/>
-                          </a:rPr>
-                          <m:t>𝑠</m:t>
-                        </m:r>
-                      </m:e>
-                      <m:sub>
-                        <m:r>
-                          <a:rPr lang="en-US" b="0" i="1" smtClean="0">
-                            <a:latin typeface="Cambria Math" panose="02040503050406030204" pitchFamily="18" charset="0"/>
-                          </a:rPr>
-                          <m:t>𝑦</m:t>
-                        </m:r>
-                      </m:sub>
-                    </m:sSub>
-                    <m:r>
-                      <a:rPr lang="en-US" b="0" i="1" smtClean="0">
-                        <a:latin typeface="Cambria Math" panose="02040503050406030204" pitchFamily="18" charset="0"/>
-                      </a:rPr>
-                      <m:t>=</m:t>
-                    </m:r>
-                    <m:d>
-                      <m:dPr>
-                        <m:begChr m:val="|"/>
-                        <m:endChr m:val="|"/>
-                        <m:ctrlPr>
-                          <a:rPr lang="en-US" b="0" i="1" smtClean="0">
-                            <a:latin typeface="Cambria Math" panose="02040503050406030204" pitchFamily="18" charset="0"/>
-                          </a:rPr>
-                        </m:ctrlPr>
-                      </m:dPr>
-                      <m:e>
-                        <m:r>
-                          <a:rPr lang="en-US" b="0" i="1" smtClean="0">
-                            <a:latin typeface="Cambria Math" panose="02040503050406030204" pitchFamily="18" charset="0"/>
-                          </a:rPr>
-                          <m:t>𝑎</m:t>
-                        </m:r>
-                      </m:e>
-                    </m:d>
-                    <m:sSub>
-                      <m:sSubPr>
-                        <m:ctrlPr>
-                          <a:rPr lang="en-US" b="0" i="1" smtClean="0">
-                            <a:latin typeface="Cambria Math" panose="02040503050406030204" pitchFamily="18" charset="0"/>
-                          </a:rPr>
-                        </m:ctrlPr>
-                      </m:sSubPr>
-                      <m:e>
-                        <m:r>
-                          <a:rPr lang="en-US" b="0" i="1" smtClean="0">
-                            <a:latin typeface="Cambria Math" panose="02040503050406030204" pitchFamily="18" charset="0"/>
-                          </a:rPr>
-                          <m:t>⋅</m:t>
-                        </m:r>
-                        <m:r>
-                          <a:rPr lang="en-US" b="0" i="1" smtClean="0">
-                            <a:latin typeface="Cambria Math" panose="02040503050406030204" pitchFamily="18" charset="0"/>
-                          </a:rPr>
-                          <m:t>𝑠</m:t>
-                        </m:r>
-                      </m:e>
-                      <m:sub>
-                        <m:r>
-                          <a:rPr lang="en-US" b="0" i="1" smtClean="0">
-                            <a:latin typeface="Cambria Math" panose="02040503050406030204" pitchFamily="18" charset="0"/>
-                          </a:rPr>
-                          <m:t>𝑥</m:t>
-                        </m:r>
-                      </m:sub>
-                    </m:sSub>
-                  </m:oMath>
-                </a14:m>
-                <a:r>
-                  <a:rPr lang="en-US" dirty="0"/>
-                  <a:t>   (the standard deviation is not affected by shift </a:t>
-                </a:r>
-                <a14:m>
-                  <m:oMath xmlns:m="http://schemas.openxmlformats.org/officeDocument/2006/math">
-                    <m:r>
-                      <a:rPr lang="en-US" b="0" i="1" smtClean="0">
-                        <a:latin typeface="Cambria Math" panose="02040503050406030204" pitchFamily="18" charset="0"/>
-                      </a:rPr>
-                      <m:t>𝑏</m:t>
-                    </m:r>
-                  </m:oMath>
-                </a14:m>
-                <a:r>
-                  <a:rPr lang="en-US" dirty="0"/>
-                  <a:t>)</a:t>
-                </a:r>
-              </a:p>
-              <a:p>
-                <a:endParaRPr lang="en-US" dirty="0"/>
-              </a:p>
-              <a:p>
-                <a14:m>
-                  <m:oMath xmlns:m="http://schemas.openxmlformats.org/officeDocument/2006/math">
-                    <m:r>
-                      <a:rPr lang="en-US" b="0" i="1" smtClean="0">
-                        <a:latin typeface="Cambria Math" panose="02040503050406030204" pitchFamily="18" charset="0"/>
-                      </a:rPr>
-                      <m:t>𝐼𝑄</m:t>
-                    </m:r>
-                    <m:sSub>
-                      <m:sSubPr>
-                        <m:ctrlPr>
-                          <a:rPr lang="en-US" b="0" i="1" smtClean="0">
-                            <a:latin typeface="Cambria Math" panose="02040503050406030204" pitchFamily="18" charset="0"/>
-                          </a:rPr>
-                        </m:ctrlPr>
-                      </m:sSubPr>
-                      <m:e>
-                        <m:r>
-                          <a:rPr lang="en-US" b="0" i="1" smtClean="0">
-                            <a:latin typeface="Cambria Math" panose="02040503050406030204" pitchFamily="18" charset="0"/>
-                          </a:rPr>
-                          <m:t>𝑅</m:t>
-                        </m:r>
-                      </m:e>
-                      <m:sub>
-                        <m:r>
-                          <a:rPr lang="en-US" b="0" i="1" smtClean="0">
-                            <a:latin typeface="Cambria Math" panose="02040503050406030204" pitchFamily="18" charset="0"/>
-                          </a:rPr>
-                          <m:t>𝑦</m:t>
-                        </m:r>
-                      </m:sub>
-                    </m:sSub>
-                    <m:r>
-                      <a:rPr lang="en-US" b="0" i="1" smtClean="0">
-                        <a:latin typeface="Cambria Math" panose="02040503050406030204" pitchFamily="18" charset="0"/>
-                      </a:rPr>
-                      <m:t>=</m:t>
-                    </m:r>
-                    <m:d>
-                      <m:dPr>
-                        <m:begChr m:val="|"/>
-                        <m:endChr m:val="|"/>
-                        <m:ctrlPr>
-                          <a:rPr lang="en-US" b="0" i="1" smtClean="0">
-                            <a:latin typeface="Cambria Math" panose="02040503050406030204" pitchFamily="18" charset="0"/>
-                          </a:rPr>
-                        </m:ctrlPr>
-                      </m:dPr>
-                      <m:e>
-                        <m:r>
-                          <a:rPr lang="en-US" b="0" i="1" smtClean="0">
-                            <a:latin typeface="Cambria Math" panose="02040503050406030204" pitchFamily="18" charset="0"/>
-                          </a:rPr>
-                          <m:t>𝑎</m:t>
-                        </m:r>
-                      </m:e>
-                    </m:d>
-                    <m:r>
-                      <a:rPr lang="en-US" b="0" i="1" smtClean="0">
-                        <a:latin typeface="Cambria Math" panose="02040503050406030204" pitchFamily="18" charset="0"/>
-                      </a:rPr>
-                      <m:t>⋅</m:t>
-                    </m:r>
-                    <m:r>
-                      <a:rPr lang="en-US" b="0" i="1" smtClean="0">
-                        <a:latin typeface="Cambria Math" panose="02040503050406030204" pitchFamily="18" charset="0"/>
-                      </a:rPr>
-                      <m:t>𝐼𝑄</m:t>
-                    </m:r>
-                    <m:sSub>
-                      <m:sSubPr>
-                        <m:ctrlPr>
-                          <a:rPr lang="en-US" b="0" i="1" smtClean="0">
-                            <a:latin typeface="Cambria Math" panose="02040503050406030204" pitchFamily="18" charset="0"/>
-                          </a:rPr>
-                        </m:ctrlPr>
-                      </m:sSubPr>
-                      <m:e>
-                        <m:r>
-                          <a:rPr lang="en-US" b="0" i="1" smtClean="0">
-                            <a:latin typeface="Cambria Math" panose="02040503050406030204" pitchFamily="18" charset="0"/>
-                          </a:rPr>
-                          <m:t>𝑅</m:t>
-                        </m:r>
-                      </m:e>
-                      <m:sub>
-                        <m:r>
-                          <a:rPr lang="en-US" b="0" i="1" smtClean="0">
-                            <a:latin typeface="Cambria Math" panose="02040503050406030204" pitchFamily="18" charset="0"/>
-                          </a:rPr>
-                          <m:t>𝑥</m:t>
-                        </m:r>
-                      </m:sub>
-                    </m:sSub>
-                  </m:oMath>
-                </a14:m>
-                <a:r>
-                  <a:rPr lang="en-US" dirty="0"/>
-                  <a:t>  (the </a:t>
-                </a:r>
-                <a14:m>
-                  <m:oMath xmlns:m="http://schemas.openxmlformats.org/officeDocument/2006/math">
-                    <m:r>
-                      <a:rPr lang="en-US" b="0" i="1" smtClean="0">
-                        <a:latin typeface="Cambria Math" panose="02040503050406030204" pitchFamily="18" charset="0"/>
-                      </a:rPr>
-                      <m:t>𝐼𝑄𝑅</m:t>
-                    </m:r>
-                  </m:oMath>
-                </a14:m>
-                <a:r>
-                  <a:rPr lang="en-US" dirty="0"/>
-                  <a:t> is not affected by shift </a:t>
-                </a:r>
-                <a14:m>
-                  <m:oMath xmlns:m="http://schemas.openxmlformats.org/officeDocument/2006/math">
-                    <m:r>
-                      <a:rPr lang="en-US" i="1">
-                        <a:latin typeface="Cambria Math" panose="02040503050406030204" pitchFamily="18" charset="0"/>
-                      </a:rPr>
-                      <m:t>𝑏</m:t>
-                    </m:r>
-                  </m:oMath>
-                </a14:m>
-                <a:r>
-                  <a:rPr lang="en-US" dirty="0"/>
-                  <a:t>)</a:t>
-                </a:r>
-              </a:p>
-              <a:p>
-                <a:endParaRPr lang="en-US" dirty="0"/>
-              </a:p>
-              <a:p>
-                <a:endParaRPr lang="en-US" dirty="0"/>
-              </a:p>
-              <a:p>
-                <a:endParaRPr lang="en-US" dirty="0"/>
-              </a:p>
-            </p:txBody>
-          </p:sp>
-        </mc:Choice>
-        <mc:Fallback xmlns="">
-          <p:sp>
-            <p:nvSpPr>
-              <p:cNvPr id="3" name="Content Placeholder 2">
-                <a:extLst>
-                  <a:ext uri="{FF2B5EF4-FFF2-40B4-BE49-F238E27FC236}">
-                    <a16:creationId xmlns:a16="http://schemas.microsoft.com/office/drawing/2014/main" id="{1CCE655D-177B-3706-8F5E-2003CAE9824E}"/>
-                  </a:ext>
-                </a:extLst>
-              </p:cNvPr>
-              <p:cNvSpPr>
-                <a:spLocks noGrp="1" noRot="1" noChangeAspect="1" noMove="1" noResize="1" noEditPoints="1" noAdjustHandles="1" noChangeArrowheads="1" noChangeShapeType="1" noTextEdit="1"/>
-              </p:cNvSpPr>
-              <p:nvPr>
-                <p:ph idx="1"/>
-              </p:nvPr>
-            </p:nvSpPr>
-            <p:spPr>
-              <a:blipFill>
-                <a:blip r:embed="rId2"/>
-                <a:stretch>
-                  <a:fillRect l="-928" t="-2801"/>
-                </a:stretch>
-              </a:blipFill>
-            </p:spPr>
-            <p:txBody>
-              <a:bodyPr/>
-              <a:lstStyle/>
-              <a:p>
-                <a:r>
-                  <a:rPr lang="en-US">
-                    <a:noFill/>
-                  </a:rPr>
-                  <a:t> </a:t>
-                </a:r>
-              </a:p>
-            </p:txBody>
-          </p:sp>
-        </mc:Fallback>
-      </mc:AlternateContent>
-    </p:spTree>
-    <p:extLst>
-      <p:ext uri="{BB962C8B-B14F-4D97-AF65-F5344CB8AC3E}">
-        <p14:creationId xmlns:p14="http://schemas.microsoft.com/office/powerpoint/2010/main" val="2540309755"/>
-      </p:ext>
-    </p:extLst>
-  </p:cSld>
-  <p:clrMapOvr>
-    <a:masterClrMapping/>
-  </p:clrMapOvr>
-</p:sld>
-</file>
-
-<file path=ppt/slides/slide21.xml><?xml version="1.0" encoding="utf-8"?>
-<p:sld xmlns:a="http://schemas.openxmlformats.org/drawingml/2006/main" xmlns:r="http://schemas.openxmlformats.org/officeDocument/2006/relationships" xmlns:p="http://schemas.openxmlformats.org/presentationml/2006/main">
-  <p:cSld>
-    <p:spTree>
-      <p:nvGrpSpPr>
-        <p:cNvPr id="1" name=""/>
-        <p:cNvGrpSpPr/>
-        <p:nvPr/>
-      </p:nvGrpSpPr>
-      <p:grpSpPr>
-        <a:xfrm>
-          <a:off x="0" y="0"/>
-          <a:ext cx="0" cy="0"/>
-          <a:chOff x="0" y="0"/>
-          <a:chExt cx="0" cy="0"/>
-        </a:xfrm>
-      </p:grpSpPr>
-      <p:sp>
-        <p:nvSpPr>
-          <p:cNvPr id="2" name="Title 1">
-            <a:extLst>
-              <a:ext uri="{FF2B5EF4-FFF2-40B4-BE49-F238E27FC236}">
-                <a16:creationId xmlns:a16="http://schemas.microsoft.com/office/drawing/2014/main" id="{451B5CB5-B235-06AC-FCA9-671B4C551952}"/>
-              </a:ext>
-            </a:extLst>
-          </p:cNvPr>
-          <p:cNvSpPr>
-            <a:spLocks noGrp="1"/>
-          </p:cNvSpPr>
-          <p:nvPr>
-            <p:ph type="title"/>
-          </p:nvPr>
-        </p:nvSpPr>
-        <p:spPr>
-          <a:xfrm>
-            <a:off x="314325" y="288925"/>
-            <a:ext cx="10515600" cy="1325563"/>
-          </a:xfrm>
-        </p:spPr>
-        <p:txBody>
-          <a:bodyPr/>
-          <a:lstStyle/>
-          <a:p>
-            <a:r>
-              <a:rPr lang="en-US" dirty="0"/>
-              <a:t>Sampling Distribution</a:t>
-            </a:r>
-          </a:p>
-        </p:txBody>
-      </p:sp>
-      <p:sp>
-        <p:nvSpPr>
-          <p:cNvPr id="3" name="Content Placeholder 2">
-            <a:extLst>
-              <a:ext uri="{FF2B5EF4-FFF2-40B4-BE49-F238E27FC236}">
-                <a16:creationId xmlns:a16="http://schemas.microsoft.com/office/drawing/2014/main" id="{E593A499-6EFD-AAFC-D0C6-F0DE3C8389D1}"/>
-              </a:ext>
-            </a:extLst>
-          </p:cNvPr>
-          <p:cNvSpPr>
-            <a:spLocks noGrp="1"/>
-          </p:cNvSpPr>
-          <p:nvPr>
-            <p:ph idx="1"/>
-          </p:nvPr>
-        </p:nvSpPr>
-        <p:spPr>
-          <a:xfrm>
-            <a:off x="314325" y="1854200"/>
-            <a:ext cx="5507182" cy="4351338"/>
-          </a:xfrm>
-        </p:spPr>
-        <p:txBody>
-          <a:bodyPr>
-            <a:normAutofit/>
-          </a:bodyPr>
-          <a:lstStyle/>
-          <a:p>
-            <a:r>
-              <a:rPr lang="en-US" sz="2400" dirty="0"/>
-              <a:t>Consider a survey to estimate the mean salary of high school teachers in a given school district. The goal of such a survey would be to use the mean from the sample of observations of teacher salaries (a statistic) as an estimate of the mean salary of the population of teachers in the entire school district (a parameter). </a:t>
-            </a:r>
-            <a:r>
-              <a:rPr lang="en-US" sz="2400" u="sng" dirty="0"/>
-              <a:t>This is an example of statistical inference.</a:t>
-            </a:r>
-          </a:p>
-        </p:txBody>
-      </p:sp>
-      <p:pic>
-        <p:nvPicPr>
-          <p:cNvPr id="5" name="Picture 4">
-            <a:extLst>
-              <a:ext uri="{FF2B5EF4-FFF2-40B4-BE49-F238E27FC236}">
-                <a16:creationId xmlns:a16="http://schemas.microsoft.com/office/drawing/2014/main" id="{58C1D6BB-6103-22A8-9B1C-DF8E00D84D5B}"/>
-              </a:ext>
-            </a:extLst>
-          </p:cNvPr>
-          <p:cNvPicPr>
-            <a:picLocks noChangeAspect="1"/>
-          </p:cNvPicPr>
-          <p:nvPr/>
-        </p:nvPicPr>
-        <p:blipFill>
-          <a:blip r:embed="rId2"/>
-          <a:stretch>
-            <a:fillRect/>
-          </a:stretch>
-        </p:blipFill>
-        <p:spPr>
-          <a:xfrm>
-            <a:off x="6639034" y="89126"/>
-            <a:ext cx="4990990" cy="3406549"/>
-          </a:xfrm>
-          <a:prstGeom prst="rect">
-            <a:avLst/>
-          </a:prstGeom>
-        </p:spPr>
-      </p:pic>
-      <p:pic>
-        <p:nvPicPr>
-          <p:cNvPr id="7" name="Picture 6">
-            <a:extLst>
-              <a:ext uri="{FF2B5EF4-FFF2-40B4-BE49-F238E27FC236}">
-                <a16:creationId xmlns:a16="http://schemas.microsoft.com/office/drawing/2014/main" id="{ED1FA683-7D5A-CF8C-B8D8-2C93D3E4ED99}"/>
-              </a:ext>
-            </a:extLst>
-          </p:cNvPr>
-          <p:cNvPicPr>
-            <a:picLocks noChangeAspect="1"/>
-          </p:cNvPicPr>
-          <p:nvPr/>
-        </p:nvPicPr>
-        <p:blipFill>
-          <a:blip r:embed="rId3"/>
-          <a:stretch>
-            <a:fillRect/>
-          </a:stretch>
-        </p:blipFill>
-        <p:spPr>
-          <a:xfrm>
-            <a:off x="6667228" y="3599731"/>
-            <a:ext cx="4962795" cy="3258269"/>
-          </a:xfrm>
-          <a:prstGeom prst="rect">
-            <a:avLst/>
-          </a:prstGeom>
-        </p:spPr>
-      </p:pic>
-    </p:spTree>
-    <p:extLst>
-      <p:ext uri="{BB962C8B-B14F-4D97-AF65-F5344CB8AC3E}">
-        <p14:creationId xmlns:p14="http://schemas.microsoft.com/office/powerpoint/2010/main" val="2276064796"/>
-      </p:ext>
-    </p:extLst>
-  </p:cSld>
-  <p:clrMapOvr>
-    <a:masterClrMapping/>
-  </p:clrMapOvr>
-  <p:timing>
-    <p:tnLst>
-      <p:par>
-        <p:cTn id="1" dur="indefinite" restart="never" nodeType="tmRoot">
-          <p:childTnLst>
-            <p:seq concurrent="1" nextAc="seek">
-              <p:cTn id="2" dur="indefinite" nodeType="mainSeq">
-                <p:childTnLst>
-                  <p:par>
-                    <p:cTn id="3" fill="hold">
-                      <p:stCondLst>
-                        <p:cond delay="indefinite"/>
-                      </p:stCondLst>
-                      <p:childTnLst>
-                        <p:par>
-                          <p:cTn id="4" fill="hold">
-                            <p:stCondLst>
-                              <p:cond delay="0"/>
-                            </p:stCondLst>
-                            <p:childTnLst>
-                              <p:par>
-                                <p:cTn id="5" presetID="1" presetClass="entr" presetSubtype="0" fill="hold" nodeType="clickEffect">
-                                  <p:stCondLst>
-                                    <p:cond delay="0"/>
-                                  </p:stCondLst>
-                                  <p:childTnLst>
-                                    <p:set>
-                                      <p:cBhvr>
-                                        <p:cTn id="6" dur="1" fill="hold">
-                                          <p:stCondLst>
-                                            <p:cond delay="0"/>
-                                          </p:stCondLst>
-                                        </p:cTn>
-                                        <p:tgtEl>
-                                          <p:spTgt spid="7"/>
-                                        </p:tgtEl>
-                                        <p:attrNameLst>
-                                          <p:attrName>style.visibility</p:attrName>
-                                        </p:attrNameLst>
-                                      </p:cBhvr>
-                                      <p:to>
-                                        <p:strVal val="visible"/>
-                                      </p:to>
-                                    </p:set>
-                                  </p:childTnLst>
-                                </p:cTn>
-                              </p:par>
-                            </p:childTnLst>
-                          </p:cTn>
-                        </p:par>
-                      </p:childTnLst>
-                    </p:cTn>
-                  </p:par>
-                </p:childTnLst>
-              </p:cTn>
-              <p:prevCondLst>
-                <p:cond evt="onPrev" delay="0">
-                  <p:tgtEl>
-                    <p:sldTgt/>
-                  </p:tgtEl>
-                </p:cond>
-              </p:prevCondLst>
-              <p:nextCondLst>
-                <p:cond evt="onNext" delay="0">
-                  <p:tgtEl>
-                    <p:sldTgt/>
-                  </p:tgtEl>
-                </p:cond>
-              </p:nextCondLst>
-            </p:seq>
-          </p:childTnLst>
-        </p:cTn>
-      </p:par>
-    </p:tnLst>
-  </p:timing>
-</p:sld>
-</file>
-
-<file path=ppt/slides/slide22.xml><?xml version="1.0" encoding="utf-8"?>
-<p:sld xmlns:a="http://schemas.openxmlformats.org/drawingml/2006/main" xmlns:r="http://schemas.openxmlformats.org/officeDocument/2006/relationships" xmlns:p="http://schemas.openxmlformats.org/presentationml/2006/main">
-  <p:cSld>
-    <p:spTree>
-      <p:nvGrpSpPr>
-        <p:cNvPr id="1" name=""/>
-        <p:cNvGrpSpPr/>
-        <p:nvPr/>
-      </p:nvGrpSpPr>
-      <p:grpSpPr>
-        <a:xfrm>
-          <a:off x="0" y="0"/>
-          <a:ext cx="0" cy="0"/>
-          <a:chOff x="0" y="0"/>
-          <a:chExt cx="0" cy="0"/>
-        </a:xfrm>
-      </p:grpSpPr>
-      <p:sp>
-        <p:nvSpPr>
-          <p:cNvPr id="2" name="Title 1">
-            <a:extLst>
-              <a:ext uri="{FF2B5EF4-FFF2-40B4-BE49-F238E27FC236}">
-                <a16:creationId xmlns:a16="http://schemas.microsoft.com/office/drawing/2014/main" id="{582CC7A8-B01D-CB74-1D74-7A74E7139FAB}"/>
-              </a:ext>
-            </a:extLst>
-          </p:cNvPr>
-          <p:cNvSpPr>
-            <a:spLocks noGrp="1"/>
-          </p:cNvSpPr>
-          <p:nvPr>
-            <p:ph type="title"/>
-          </p:nvPr>
-        </p:nvSpPr>
-        <p:spPr>
-          <a:xfrm>
-            <a:off x="190500" y="69850"/>
-            <a:ext cx="10515600" cy="1325563"/>
-          </a:xfrm>
-        </p:spPr>
-        <p:txBody>
-          <a:bodyPr/>
-          <a:lstStyle/>
-          <a:p>
-            <a:r>
-              <a:rPr lang="en-US" dirty="0"/>
-              <a:t>Sampling Distribution</a:t>
-            </a:r>
-          </a:p>
-        </p:txBody>
-      </p:sp>
-      <p:pic>
-        <p:nvPicPr>
-          <p:cNvPr id="5" name="Picture 4">
-            <a:extLst>
-              <a:ext uri="{FF2B5EF4-FFF2-40B4-BE49-F238E27FC236}">
-                <a16:creationId xmlns:a16="http://schemas.microsoft.com/office/drawing/2014/main" id="{36385016-377B-A9BE-E6C9-D675F5643F99}"/>
-              </a:ext>
-            </a:extLst>
-          </p:cNvPr>
-          <p:cNvPicPr>
-            <a:picLocks noChangeAspect="1"/>
-          </p:cNvPicPr>
-          <p:nvPr/>
-        </p:nvPicPr>
-        <p:blipFill>
-          <a:blip r:embed="rId2"/>
-          <a:stretch>
-            <a:fillRect/>
-          </a:stretch>
-        </p:blipFill>
-        <p:spPr>
-          <a:xfrm>
-            <a:off x="190500" y="2780568"/>
-            <a:ext cx="5682165" cy="3860862"/>
-          </a:xfrm>
-          <a:prstGeom prst="rect">
-            <a:avLst/>
-          </a:prstGeom>
-        </p:spPr>
-      </p:pic>
-      <p:pic>
-        <p:nvPicPr>
-          <p:cNvPr id="7" name="Picture 6">
-            <a:extLst>
-              <a:ext uri="{FF2B5EF4-FFF2-40B4-BE49-F238E27FC236}">
-                <a16:creationId xmlns:a16="http://schemas.microsoft.com/office/drawing/2014/main" id="{1CED2A7B-3232-62C8-8E71-FFC0C6BF9146}"/>
-              </a:ext>
-            </a:extLst>
-          </p:cNvPr>
-          <p:cNvPicPr>
-            <a:picLocks noChangeAspect="1"/>
-          </p:cNvPicPr>
-          <p:nvPr/>
-        </p:nvPicPr>
-        <p:blipFill>
-          <a:blip r:embed="rId3"/>
-          <a:stretch>
-            <a:fillRect/>
-          </a:stretch>
-        </p:blipFill>
-        <p:spPr>
-          <a:xfrm>
-            <a:off x="6344150" y="2753665"/>
-            <a:ext cx="5839330" cy="3887765"/>
-          </a:xfrm>
-          <a:prstGeom prst="rect">
-            <a:avLst/>
-          </a:prstGeom>
-        </p:spPr>
-      </p:pic>
-      <p:sp>
-        <p:nvSpPr>
-          <p:cNvPr id="8" name="Arrow: Curved Down 7">
-            <a:extLst>
-              <a:ext uri="{FF2B5EF4-FFF2-40B4-BE49-F238E27FC236}">
-                <a16:creationId xmlns:a16="http://schemas.microsoft.com/office/drawing/2014/main" id="{0EBE6D96-BE48-B090-BDA3-3130E739AA15}"/>
-              </a:ext>
-            </a:extLst>
-          </p:cNvPr>
-          <p:cNvSpPr/>
-          <p:nvPr/>
-        </p:nvSpPr>
-        <p:spPr>
-          <a:xfrm>
-            <a:off x="4899891" y="2152880"/>
-            <a:ext cx="2392218" cy="554604"/>
-          </a:xfrm>
-          <a:prstGeom prst="curvedDownArrow">
-            <a:avLst/>
-          </a:prstGeom>
-        </p:spPr>
-        <p:style>
-          <a:lnRef idx="2">
-            <a:schemeClr val="accent1">
-              <a:shade val="15000"/>
-            </a:schemeClr>
-          </a:lnRef>
-          <a:fillRef idx="1">
-            <a:schemeClr val="accent1"/>
-          </a:fillRef>
-          <a:effectRef idx="0">
-            <a:schemeClr val="accent1"/>
-          </a:effectRef>
-          <a:fontRef idx="minor">
-            <a:schemeClr val="lt1"/>
-          </a:fontRef>
-        </p:style>
-        <p:txBody>
-          <a:bodyPr rtlCol="0" anchor="ctr"/>
-          <a:lstStyle/>
-          <a:p>
-            <a:pPr algn="ctr"/>
-            <a:endParaRPr lang="en-US">
-              <a:solidFill>
-                <a:schemeClr val="tx1"/>
-              </a:solidFill>
-            </a:endParaRPr>
-          </a:p>
-        </p:txBody>
-      </p:sp>
-      <p:sp>
-        <p:nvSpPr>
-          <p:cNvPr id="9" name="TextBox 8">
-            <a:extLst>
-              <a:ext uri="{FF2B5EF4-FFF2-40B4-BE49-F238E27FC236}">
-                <a16:creationId xmlns:a16="http://schemas.microsoft.com/office/drawing/2014/main" id="{359DC34C-79CC-960D-8EC6-E0BB75EC93F7}"/>
-              </a:ext>
-            </a:extLst>
-          </p:cNvPr>
-          <p:cNvSpPr txBox="1"/>
-          <p:nvPr/>
-        </p:nvSpPr>
-        <p:spPr>
-          <a:xfrm>
-            <a:off x="5631770" y="1783548"/>
-            <a:ext cx="928459" cy="369332"/>
-          </a:xfrm>
-          <a:prstGeom prst="rect">
-            <a:avLst/>
-          </a:prstGeom>
-          <a:noFill/>
-        </p:spPr>
-        <p:txBody>
-          <a:bodyPr wrap="none" rtlCol="0">
-            <a:spAutoFit/>
-          </a:bodyPr>
-          <a:lstStyle/>
-          <a:p>
-            <a:r>
-              <a:rPr lang="en-US" dirty="0"/>
-              <a:t>Sample </a:t>
-            </a:r>
-          </a:p>
-        </p:txBody>
-      </p:sp>
-    </p:spTree>
-    <p:extLst>
-      <p:ext uri="{BB962C8B-B14F-4D97-AF65-F5344CB8AC3E}">
-        <p14:creationId xmlns:p14="http://schemas.microsoft.com/office/powerpoint/2010/main" val="555378911"/>
-      </p:ext>
-    </p:extLst>
-  </p:cSld>
-  <p:clrMapOvr>
-    <a:masterClrMapping/>
-  </p:clrMapOvr>
-  <p:timing>
-    <p:tnLst>
-      <p:par>
-        <p:cTn id="1" dur="indefinite" restart="never" nodeType="tmRoot">
-          <p:childTnLst>
-            <p:seq concurrent="1" nextAc="seek">
-              <p:cTn id="2" dur="indefinite" nodeType="mainSeq">
-                <p:childTnLst>
-                  <p:par>
-                    <p:cTn id="3" fill="hold">
-                      <p:stCondLst>
-                        <p:cond delay="indefinite"/>
-                      </p:stCondLst>
-                      <p:childTnLst>
-                        <p:par>
-                          <p:cTn id="4" fill="hold">
-                            <p:stCondLst>
-                              <p:cond delay="0"/>
-                            </p:stCondLst>
-                            <p:childTnLst>
-                              <p:par>
-                                <p:cTn id="5" presetID="1" presetClass="entr" presetSubtype="0" fill="hold" grpId="0" nodeType="clickEffect">
-                                  <p:stCondLst>
-                                    <p:cond delay="0"/>
-                                  </p:stCondLst>
-                                  <p:childTnLst>
-                                    <p:set>
-                                      <p:cBhvr>
-                                        <p:cTn id="6" dur="1" fill="hold">
-                                          <p:stCondLst>
-                                            <p:cond delay="0"/>
-                                          </p:stCondLst>
-                                        </p:cTn>
-                                        <p:tgtEl>
-                                          <p:spTgt spid="9"/>
-                                        </p:tgtEl>
-                                        <p:attrNameLst>
-                                          <p:attrName>style.visibility</p:attrName>
-                                        </p:attrNameLst>
-                                      </p:cBhvr>
-                                      <p:to>
-                                        <p:strVal val="visible"/>
-                                      </p:to>
-                                    </p:set>
-                                  </p:childTnLst>
-                                </p:cTn>
-                              </p:par>
-                              <p:par>
-                                <p:cTn id="7" presetID="1" presetClass="entr" presetSubtype="0" fill="hold" grpId="0" nodeType="withEffect">
-                                  <p:stCondLst>
-                                    <p:cond delay="0"/>
-                                  </p:stCondLst>
-                                  <p:childTnLst>
-                                    <p:set>
-                                      <p:cBhvr>
-                                        <p:cTn id="8" dur="1" fill="hold">
-                                          <p:stCondLst>
-                                            <p:cond delay="0"/>
-                                          </p:stCondLst>
-                                        </p:cTn>
-                                        <p:tgtEl>
-                                          <p:spTgt spid="8"/>
-                                        </p:tgtEl>
-                                        <p:attrNameLst>
-                                          <p:attrName>style.visibility</p:attrName>
-                                        </p:attrNameLst>
-                                      </p:cBhvr>
-                                      <p:to>
-                                        <p:strVal val="visible"/>
-                                      </p:to>
-                                    </p:set>
-                                  </p:childTnLst>
-                                </p:cTn>
-                              </p:par>
-                              <p:par>
-                                <p:cTn id="9" presetID="1" presetClass="entr" presetSubtype="0" fill="hold" nodeType="withEffect">
-                                  <p:stCondLst>
-                                    <p:cond delay="0"/>
-                                  </p:stCondLst>
-                                  <p:childTnLst>
-                                    <p:set>
-                                      <p:cBhvr>
-                                        <p:cTn id="10" dur="1" fill="hold">
-                                          <p:stCondLst>
-                                            <p:cond delay="0"/>
-                                          </p:stCondLst>
-                                        </p:cTn>
-                                        <p:tgtEl>
-                                          <p:spTgt spid="7"/>
-                                        </p:tgtEl>
-                                        <p:attrNameLst>
-                                          <p:attrName>style.visibility</p:attrName>
-                                        </p:attrNameLst>
-                                      </p:cBhvr>
-                                      <p:to>
-                                        <p:strVal val="visible"/>
-                                      </p:to>
-                                    </p:set>
-                                  </p:childTnLst>
-                                </p:cTn>
-                              </p:par>
-                            </p:childTnLst>
-                          </p:cTn>
-                        </p:par>
-                      </p:childTnLst>
-                    </p:cTn>
-                  </p:par>
-                </p:childTnLst>
-              </p:cTn>
-              <p:prevCondLst>
-                <p:cond evt="onPrev" delay="0">
-                  <p:tgtEl>
-                    <p:sldTgt/>
-                  </p:tgtEl>
-                </p:cond>
-              </p:prevCondLst>
-              <p:nextCondLst>
-                <p:cond evt="onNext" delay="0">
-                  <p:tgtEl>
-                    <p:sldTgt/>
-                  </p:tgtEl>
-                </p:cond>
-              </p:nextCondLst>
-            </p:seq>
-          </p:childTnLst>
-        </p:cTn>
-      </p:par>
-    </p:tnLst>
-    <p:bldLst>
-      <p:bldP spid="8" grpId="0" animBg="1"/>
-      <p:bldP spid="9" grpId="0"/>
-    </p:bldLst>
-  </p:timing>
-</p:sld>
-</file>
-
-<file path=ppt/slides/slide23.xml><?xml version="1.0" encoding="utf-8"?>
-<p:sld xmlns:a="http://schemas.openxmlformats.org/drawingml/2006/main" xmlns:r="http://schemas.openxmlformats.org/officeDocument/2006/relationships" xmlns:p="http://schemas.openxmlformats.org/presentationml/2006/main">
-  <p:cSld>
-    <p:spTree>
-      <p:nvGrpSpPr>
-        <p:cNvPr id="1" name=""/>
-        <p:cNvGrpSpPr/>
-        <p:nvPr/>
-      </p:nvGrpSpPr>
-      <p:grpSpPr>
-        <a:xfrm>
-          <a:off x="0" y="0"/>
-          <a:ext cx="0" cy="0"/>
-          <a:chOff x="0" y="0"/>
-          <a:chExt cx="0" cy="0"/>
-        </a:xfrm>
-      </p:grpSpPr>
-      <p:sp>
-        <p:nvSpPr>
-          <p:cNvPr id="2" name="Title 1">
-            <a:extLst>
-              <a:ext uri="{FF2B5EF4-FFF2-40B4-BE49-F238E27FC236}">
-                <a16:creationId xmlns:a16="http://schemas.microsoft.com/office/drawing/2014/main" id="{B74FE223-8B71-AFFA-B5C7-CBF4798E7E1A}"/>
-              </a:ext>
-            </a:extLst>
-          </p:cNvPr>
-          <p:cNvSpPr>
-            <a:spLocks noGrp="1"/>
-          </p:cNvSpPr>
-          <p:nvPr>
-            <p:ph type="title"/>
-          </p:nvPr>
-        </p:nvSpPr>
-        <p:spPr/>
-        <p:txBody>
-          <a:bodyPr/>
-          <a:lstStyle/>
-          <a:p>
-            <a:r>
-              <a:rPr lang="en-US" dirty="0"/>
-              <a:t>Margin of Error</a:t>
-            </a:r>
-          </a:p>
-        </p:txBody>
-      </p:sp>
-      <p:sp>
-        <p:nvSpPr>
-          <p:cNvPr id="3" name="Content Placeholder 2">
-            <a:extLst>
-              <a:ext uri="{FF2B5EF4-FFF2-40B4-BE49-F238E27FC236}">
-                <a16:creationId xmlns:a16="http://schemas.microsoft.com/office/drawing/2014/main" id="{7E2D358D-2CAC-688F-AE27-E390C8C11917}"/>
-              </a:ext>
-            </a:extLst>
-          </p:cNvPr>
-          <p:cNvSpPr>
-            <a:spLocks noGrp="1"/>
-          </p:cNvSpPr>
-          <p:nvPr>
-            <p:ph idx="1"/>
-          </p:nvPr>
-        </p:nvSpPr>
-        <p:spPr>
-          <a:xfrm>
-            <a:off x="838200" y="1825625"/>
-            <a:ext cx="5461000" cy="4351338"/>
-          </a:xfrm>
-        </p:spPr>
-        <p:txBody>
-          <a:bodyPr>
-            <a:normAutofit fontScale="92500" lnSpcReduction="10000"/>
-          </a:bodyPr>
-          <a:lstStyle/>
-          <a:p>
-            <a:r>
-              <a:rPr lang="en-US" dirty="0"/>
-              <a:t>The </a:t>
-            </a:r>
-            <a:r>
-              <a:rPr lang="en-US" b="1" dirty="0"/>
-              <a:t>margin of error </a:t>
-            </a:r>
-            <a:r>
-              <a:rPr lang="en-US" dirty="0"/>
-              <a:t>of an estimate measures how far we expect an estimate to fall from the true value of a population parameter</a:t>
-            </a:r>
-          </a:p>
-          <a:p>
-            <a:endParaRPr lang="en-US" b="1" dirty="0"/>
-          </a:p>
-          <a:p>
-            <a:r>
-              <a:rPr lang="en-US" dirty="0"/>
-              <a:t>It is a measure of the between sample variability in our estimate</a:t>
-            </a:r>
-          </a:p>
-          <a:p>
-            <a:endParaRPr lang="en-US" dirty="0"/>
-          </a:p>
-          <a:p>
-            <a:r>
-              <a:rPr lang="en-US" dirty="0"/>
-              <a:t>It is the largest distance between the true population parameter and an estimate that is not an outlier</a:t>
-            </a:r>
-          </a:p>
-        </p:txBody>
-      </p:sp>
-      <p:pic>
-        <p:nvPicPr>
-          <p:cNvPr id="5" name="Picture 4">
-            <a:extLst>
-              <a:ext uri="{FF2B5EF4-FFF2-40B4-BE49-F238E27FC236}">
-                <a16:creationId xmlns:a16="http://schemas.microsoft.com/office/drawing/2014/main" id="{A81AB6AA-7806-20E9-027E-B2F0B29BFBBE}"/>
-              </a:ext>
-            </a:extLst>
-          </p:cNvPr>
-          <p:cNvPicPr>
-            <a:picLocks noChangeAspect="1"/>
-          </p:cNvPicPr>
-          <p:nvPr/>
-        </p:nvPicPr>
-        <p:blipFill>
-          <a:blip r:embed="rId2"/>
-          <a:stretch>
-            <a:fillRect/>
-          </a:stretch>
-        </p:blipFill>
-        <p:spPr>
-          <a:xfrm>
-            <a:off x="6373649" y="684709"/>
-            <a:ext cx="5818351" cy="4032909"/>
-          </a:xfrm>
-          <a:prstGeom prst="rect">
-            <a:avLst/>
-          </a:prstGeom>
-        </p:spPr>
-      </p:pic>
-      <p:sp>
-        <p:nvSpPr>
-          <p:cNvPr id="4" name="Left Brace 3">
-            <a:extLst>
-              <a:ext uri="{FF2B5EF4-FFF2-40B4-BE49-F238E27FC236}">
-                <a16:creationId xmlns:a16="http://schemas.microsoft.com/office/drawing/2014/main" id="{1AA04DD3-019E-D81D-1CA5-211344CA95D6}"/>
-              </a:ext>
-            </a:extLst>
-          </p:cNvPr>
-          <p:cNvSpPr/>
-          <p:nvPr/>
-        </p:nvSpPr>
-        <p:spPr>
-          <a:xfrm rot="16200000">
-            <a:off x="9314876" y="2653290"/>
-            <a:ext cx="563418" cy="4692074"/>
-          </a:xfrm>
-          <a:prstGeom prst="leftBrace">
-            <a:avLst/>
-          </a:prstGeom>
-          <a:ln w="57150"/>
-        </p:spPr>
-        <p:style>
-          <a:lnRef idx="1">
-            <a:schemeClr val="accent1"/>
-          </a:lnRef>
-          <a:fillRef idx="0">
-            <a:schemeClr val="accent1"/>
-          </a:fillRef>
-          <a:effectRef idx="0">
-            <a:schemeClr val="accent1"/>
-          </a:effectRef>
-          <a:fontRef idx="minor">
-            <a:schemeClr val="tx1"/>
-          </a:fontRef>
-        </p:style>
-        <p:txBody>
-          <a:bodyPr rtlCol="0" anchor="ctr"/>
-          <a:lstStyle/>
-          <a:p>
-            <a:pPr algn="ctr"/>
-            <a:endParaRPr lang="en-US"/>
-          </a:p>
-        </p:txBody>
-      </p:sp>
-      <p:sp>
-        <p:nvSpPr>
-          <p:cNvPr id="6" name="TextBox 5">
-            <a:extLst>
-              <a:ext uri="{FF2B5EF4-FFF2-40B4-BE49-F238E27FC236}">
-                <a16:creationId xmlns:a16="http://schemas.microsoft.com/office/drawing/2014/main" id="{576E19BB-F19E-2172-F584-3CC9452BC0F2}"/>
-              </a:ext>
-            </a:extLst>
-          </p:cNvPr>
-          <p:cNvSpPr txBox="1"/>
-          <p:nvPr/>
-        </p:nvSpPr>
-        <p:spPr>
-          <a:xfrm>
-            <a:off x="8239611" y="5347854"/>
-            <a:ext cx="2713948" cy="369332"/>
-          </a:xfrm>
-          <a:prstGeom prst="rect">
-            <a:avLst/>
-          </a:prstGeom>
-          <a:noFill/>
-        </p:spPr>
-        <p:txBody>
-          <a:bodyPr wrap="none" rtlCol="0">
-            <a:spAutoFit/>
-          </a:bodyPr>
-          <a:lstStyle/>
-          <a:p>
-            <a:r>
-              <a:rPr lang="en-US" dirty="0"/>
-              <a:t>Between sample variability</a:t>
-            </a:r>
-          </a:p>
-        </p:txBody>
-      </p:sp>
-    </p:spTree>
-    <p:extLst>
-      <p:ext uri="{BB962C8B-B14F-4D97-AF65-F5344CB8AC3E}">
-        <p14:creationId xmlns:p14="http://schemas.microsoft.com/office/powerpoint/2010/main" val="514431777"/>
       </p:ext>
     </p:extLst>
   </p:cSld>

</xml_diff>